<commit_message>
Edited Workflow diagram. FullFledgedExpts: Hybrid strategy Preempt added. Degree left
</commit_message>
<xml_diff>
--- a/WorkFlowDiagram.pptx
+++ b/WorkFlowDiagram.pptx
@@ -104,6 +104,11 @@
       </a:defRPr>
     </a:lvl9pPr>
   </p:defaultTextStyle>
+  <p:extLst>
+    <p:ext uri="{EFAFB233-063F-42B5-8137-9DF3F51BA10A}">
+      <p15:sldGuideLst xmlns:p15="http://schemas.microsoft.com/office/powerpoint/2012/main"/>
+    </p:ext>
+  </p:extLst>
 </p:presentation>
 </file>
 
@@ -238,7 +243,7 @@
           <a:p>
             <a:fld id="{53C1437C-06F9-4EA6-B756-C250F7BB411F}" type="datetimeFigureOut">
               <a:rPr lang="en-IN" smtClean="0"/>
-              <a:t>13-05-2021</a:t>
+              <a:t>17-05-2021</a:t>
             </a:fld>
             <a:endParaRPr lang="en-IN"/>
           </a:p>
@@ -408,7 +413,7 @@
           <a:p>
             <a:fld id="{53C1437C-06F9-4EA6-B756-C250F7BB411F}" type="datetimeFigureOut">
               <a:rPr lang="en-IN" smtClean="0"/>
-              <a:t>13-05-2021</a:t>
+              <a:t>17-05-2021</a:t>
             </a:fld>
             <a:endParaRPr lang="en-IN"/>
           </a:p>
@@ -588,7 +593,7 @@
           <a:p>
             <a:fld id="{53C1437C-06F9-4EA6-B756-C250F7BB411F}" type="datetimeFigureOut">
               <a:rPr lang="en-IN" smtClean="0"/>
-              <a:t>13-05-2021</a:t>
+              <a:t>17-05-2021</a:t>
             </a:fld>
             <a:endParaRPr lang="en-IN"/>
           </a:p>
@@ -758,7 +763,7 @@
           <a:p>
             <a:fld id="{53C1437C-06F9-4EA6-B756-C250F7BB411F}" type="datetimeFigureOut">
               <a:rPr lang="en-IN" smtClean="0"/>
-              <a:t>13-05-2021</a:t>
+              <a:t>17-05-2021</a:t>
             </a:fld>
             <a:endParaRPr lang="en-IN"/>
           </a:p>
@@ -1004,7 +1009,7 @@
           <a:p>
             <a:fld id="{53C1437C-06F9-4EA6-B756-C250F7BB411F}" type="datetimeFigureOut">
               <a:rPr lang="en-IN" smtClean="0"/>
-              <a:t>13-05-2021</a:t>
+              <a:t>17-05-2021</a:t>
             </a:fld>
             <a:endParaRPr lang="en-IN"/>
           </a:p>
@@ -1236,7 +1241,7 @@
           <a:p>
             <a:fld id="{53C1437C-06F9-4EA6-B756-C250F7BB411F}" type="datetimeFigureOut">
               <a:rPr lang="en-IN" smtClean="0"/>
-              <a:t>13-05-2021</a:t>
+              <a:t>17-05-2021</a:t>
             </a:fld>
             <a:endParaRPr lang="en-IN"/>
           </a:p>
@@ -1603,7 +1608,7 @@
           <a:p>
             <a:fld id="{53C1437C-06F9-4EA6-B756-C250F7BB411F}" type="datetimeFigureOut">
               <a:rPr lang="en-IN" smtClean="0"/>
-              <a:t>13-05-2021</a:t>
+              <a:t>17-05-2021</a:t>
             </a:fld>
             <a:endParaRPr lang="en-IN"/>
           </a:p>
@@ -1721,7 +1726,7 @@
           <a:p>
             <a:fld id="{53C1437C-06F9-4EA6-B756-C250F7BB411F}" type="datetimeFigureOut">
               <a:rPr lang="en-IN" smtClean="0"/>
-              <a:t>13-05-2021</a:t>
+              <a:t>17-05-2021</a:t>
             </a:fld>
             <a:endParaRPr lang="en-IN"/>
           </a:p>
@@ -1816,7 +1821,7 @@
           <a:p>
             <a:fld id="{53C1437C-06F9-4EA6-B756-C250F7BB411F}" type="datetimeFigureOut">
               <a:rPr lang="en-IN" smtClean="0"/>
-              <a:t>13-05-2021</a:t>
+              <a:t>17-05-2021</a:t>
             </a:fld>
             <a:endParaRPr lang="en-IN"/>
           </a:p>
@@ -2093,7 +2098,7 @@
           <a:p>
             <a:fld id="{53C1437C-06F9-4EA6-B756-C250F7BB411F}" type="datetimeFigureOut">
               <a:rPr lang="en-IN" smtClean="0"/>
-              <a:t>13-05-2021</a:t>
+              <a:t>17-05-2021</a:t>
             </a:fld>
             <a:endParaRPr lang="en-IN"/>
           </a:p>
@@ -2350,7 +2355,7 @@
           <a:p>
             <a:fld id="{53C1437C-06F9-4EA6-B756-C250F7BB411F}" type="datetimeFigureOut">
               <a:rPr lang="en-IN" smtClean="0"/>
-              <a:t>13-05-2021</a:t>
+              <a:t>17-05-2021</a:t>
             </a:fld>
             <a:endParaRPr lang="en-IN"/>
           </a:p>
@@ -2563,7 +2568,7 @@
           <a:p>
             <a:fld id="{53C1437C-06F9-4EA6-B756-C250F7BB411F}" type="datetimeFigureOut">
               <a:rPr lang="en-IN" smtClean="0"/>
-              <a:t>13-05-2021</a:t>
+              <a:t>17-05-2021</a:t>
             </a:fld>
             <a:endParaRPr lang="en-IN"/>
           </a:p>
@@ -3035,18 +3040,18 @@
           <a:p>
             <a:pPr algn="ctr"/>
             <a:r>
-              <a:rPr lang="en-US" dirty="0">
+              <a:rPr lang="en-US" sz="2400" dirty="0">
                 <a:solidFill>
                   <a:schemeClr val="tx1"/>
                 </a:solidFill>
               </a:rPr>
-              <a:t>Seed Selection</a:t>
+              <a:t>Vaccine seed selection</a:t>
             </a:r>
           </a:p>
           <a:p>
             <a:pPr algn="ctr"/>
             <a:r>
-              <a:rPr lang="en-IN" sz="1200" dirty="0">
+              <a:rPr lang="en-IN" sz="1600" dirty="0">
                 <a:solidFill>
                   <a:schemeClr val="tx1"/>
                 </a:solidFill>
@@ -3054,7 +3059,7 @@
               <a:t>Selects </a:t>
             </a:r>
             <a:r>
-              <a:rPr lang="en-IN" sz="1200" i="1" dirty="0">
+              <a:rPr lang="en-IN" sz="1600" i="1" dirty="0">
                 <a:solidFill>
                   <a:schemeClr val="tx1"/>
                 </a:solidFill>
@@ -3062,7 +3067,7 @@
               <a:t>k </a:t>
             </a:r>
             <a:r>
-              <a:rPr lang="en-IN" sz="1200" dirty="0">
+              <a:rPr lang="en-IN" sz="1600" dirty="0">
                 <a:solidFill>
                   <a:schemeClr val="tx1"/>
                 </a:solidFill>
@@ -3139,7 +3144,7 @@
           <a:p>
             <a:pPr algn="ctr"/>
             <a:r>
-              <a:rPr lang="en-US" dirty="0">
+              <a:rPr lang="en-US" sz="2400" dirty="0">
                 <a:solidFill>
                   <a:schemeClr val="tx1"/>
                 </a:solidFill>
@@ -3150,12 +3155,12 @@
           <a:p>
             <a:pPr algn="ctr"/>
             <a:r>
-              <a:rPr lang="en-IN" sz="1200" dirty="0">
+              <a:rPr lang="en-IN" dirty="0">
                 <a:solidFill>
                   <a:schemeClr val="tx1"/>
                 </a:solidFill>
               </a:rPr>
-              <a:t>Stochastic Agent based simulator with vaccination capabilities </a:t>
+              <a:t>Stochastic Agent based simulator</a:t>
             </a:r>
           </a:p>
         </p:txBody>
@@ -3216,8 +3221,8 @@
         </p:nvSpPr>
         <p:spPr>
           <a:xfrm>
-            <a:off x="1977347" y="2371693"/>
-            <a:ext cx="1906954" cy="307777"/>
+            <a:off x="1939402" y="2359914"/>
+            <a:ext cx="1906954" cy="338554"/>
           </a:xfrm>
           <a:prstGeom prst="rect">
             <a:avLst/>
@@ -3231,13 +3236,13 @@
           <a:lstStyle/>
           <a:p>
             <a:r>
-              <a:rPr lang="en-US" sz="1400" dirty="0">
+              <a:rPr lang="en-US" sz="1600" dirty="0">
                 <a:latin typeface="Times New Roman" panose="02020603050405020304" pitchFamily="18" charset="0"/>
                 <a:cs typeface="Times New Roman" panose="02020603050405020304" pitchFamily="18" charset="0"/>
               </a:rPr>
               <a:t>1 month</a:t>
             </a:r>
-            <a:endParaRPr lang="en-IN" sz="1400" dirty="0">
+            <a:endParaRPr lang="en-IN" sz="1600" dirty="0">
               <a:latin typeface="Times New Roman" panose="02020603050405020304" pitchFamily="18" charset="0"/>
               <a:cs typeface="Times New Roman" panose="02020603050405020304" pitchFamily="18" charset="0"/>
             </a:endParaRPr>
@@ -3650,12 +3655,124 @@
           </a:fontRef>
         </p:style>
       </p:cxnSp>
+      <p:sp>
+        <p:nvSpPr>
+          <p:cNvPr id="46" name="TextBox 45">
+            <a:extLst>
+              <a:ext uri="{FF2B5EF4-FFF2-40B4-BE49-F238E27FC236}">
+                <a16:creationId xmlns:a16="http://schemas.microsoft.com/office/drawing/2014/main" id="{15FA3FC2-400A-4E0B-A627-2190536AACA4}"/>
+              </a:ext>
+            </a:extLst>
+          </p:cNvPr>
+          <p:cNvSpPr txBox="1"/>
+          <p:nvPr/>
+        </p:nvSpPr>
+        <p:spPr>
+          <a:xfrm>
+            <a:off x="3595771" y="920716"/>
+            <a:ext cx="902811" cy="584775"/>
+          </a:xfrm>
+          <a:prstGeom prst="rect">
+            <a:avLst/>
+          </a:prstGeom>
+          <a:noFill/>
+        </p:spPr>
+        <p:txBody>
+          <a:bodyPr wrap="none" rtlCol="0">
+            <a:spAutoFit/>
+          </a:bodyPr>
+          <a:lstStyle/>
+          <a:p>
+            <a:r>
+              <a:rPr lang="en-US" sz="1600" dirty="0">
+                <a:solidFill>
+                  <a:schemeClr val="accent1"/>
+                </a:solidFill>
+                <a:latin typeface="Times New Roman" panose="02020603050405020304" pitchFamily="18" charset="0"/>
+                <a:cs typeface="Times New Roman" panose="02020603050405020304" pitchFamily="18" charset="0"/>
+              </a:rPr>
+              <a:t>Contact</a:t>
+            </a:r>
+          </a:p>
+          <a:p>
+            <a:r>
+              <a:rPr lang="en-US" sz="1600" dirty="0">
+                <a:solidFill>
+                  <a:schemeClr val="accent1"/>
+                </a:solidFill>
+                <a:latin typeface="Times New Roman" panose="02020603050405020304" pitchFamily="18" charset="0"/>
+                <a:cs typeface="Times New Roman" panose="02020603050405020304" pitchFamily="18" charset="0"/>
+              </a:rPr>
+              <a:t>Network</a:t>
+            </a:r>
+            <a:endParaRPr lang="en-IN" sz="1600" dirty="0">
+              <a:solidFill>
+                <a:schemeClr val="accent1"/>
+              </a:solidFill>
+              <a:latin typeface="Times New Roman" panose="02020603050405020304" pitchFamily="18" charset="0"/>
+              <a:cs typeface="Times New Roman" panose="02020603050405020304" pitchFamily="18" charset="0"/>
+            </a:endParaRPr>
+          </a:p>
+        </p:txBody>
+      </p:sp>
+      <p:sp>
+        <p:nvSpPr>
+          <p:cNvPr id="48" name="TextBox 47">
+            <a:extLst>
+              <a:ext uri="{FF2B5EF4-FFF2-40B4-BE49-F238E27FC236}">
+                <a16:creationId xmlns:a16="http://schemas.microsoft.com/office/drawing/2014/main" id="{0E549B93-C543-4E82-9CAC-16898F566A9D}"/>
+              </a:ext>
+            </a:extLst>
+          </p:cNvPr>
+          <p:cNvSpPr txBox="1"/>
+          <p:nvPr/>
+        </p:nvSpPr>
+        <p:spPr>
+          <a:xfrm>
+            <a:off x="3615374" y="1681879"/>
+            <a:ext cx="731566" cy="338554"/>
+          </a:xfrm>
+          <a:prstGeom prst="rect">
+            <a:avLst/>
+          </a:prstGeom>
+          <a:noFill/>
+        </p:spPr>
+        <p:txBody>
+          <a:bodyPr wrap="square" rtlCol="0">
+            <a:spAutoFit/>
+          </a:bodyPr>
+          <a:lstStyle/>
+          <a:p>
+            <a:r>
+              <a:rPr lang="en-US" sz="1600" dirty="0">
+                <a:solidFill>
+                  <a:schemeClr val="accent6">
+                    <a:lumMod val="75000"/>
+                  </a:schemeClr>
+                </a:solidFill>
+                <a:latin typeface="Times New Roman" panose="02020603050405020304" pitchFamily="18" charset="0"/>
+                <a:cs typeface="Times New Roman" panose="02020603050405020304" pitchFamily="18" charset="0"/>
+              </a:rPr>
+              <a:t>Seeds</a:t>
+            </a:r>
+            <a:endParaRPr lang="en-IN" sz="1600" dirty="0">
+              <a:solidFill>
+                <a:schemeClr val="accent6">
+                  <a:lumMod val="75000"/>
+                </a:schemeClr>
+              </a:solidFill>
+              <a:latin typeface="Times New Roman" panose="02020603050405020304" pitchFamily="18" charset="0"/>
+              <a:cs typeface="Times New Roman" panose="02020603050405020304" pitchFamily="18" charset="0"/>
+            </a:endParaRPr>
+          </a:p>
+        </p:txBody>
+      </p:sp>
       <p:cxnSp>
         <p:nvCxnSpPr>
-          <p:cNvPr id="44" name="Straight Arrow Connector 43">
+          <p:cNvPr id="51" name="Straight Arrow Connector 50">
             <a:extLst>
               <a:ext uri="{FF2B5EF4-FFF2-40B4-BE49-F238E27FC236}">
-                <a16:creationId xmlns:a16="http://schemas.microsoft.com/office/drawing/2014/main" id="{1E8BCD1E-B7BF-4863-B762-DE64BA7CB3CA}"/>
+                <a16:creationId xmlns:a16="http://schemas.microsoft.com/office/drawing/2014/main" id="{69016D2E-2FCA-402A-9714-D2FC24B99B5D}"/>
               </a:ext>
             </a:extLst>
           </p:cNvPr>
@@ -3666,18 +3783,100 @@
         </p:nvCxnSpPr>
         <p:spPr>
           <a:xfrm>
-            <a:off x="8523852" y="961379"/>
-            <a:ext cx="0" cy="1077439"/>
+            <a:off x="3641442" y="2038814"/>
+            <a:ext cx="0" cy="1240078"/>
           </a:xfrm>
           <a:prstGeom prst="straightConnector1">
             <a:avLst/>
           </a:prstGeom>
           <a:ln>
             <a:solidFill>
-              <a:schemeClr val="accent6">
-                <a:lumMod val="75000"/>
-              </a:schemeClr>
+              <a:srgbClr val="FF0000"/>
             </a:solidFill>
+            <a:tailEnd type="triangle"/>
+          </a:ln>
+        </p:spPr>
+        <p:style>
+          <a:lnRef idx="1">
+            <a:schemeClr val="accent2"/>
+          </a:lnRef>
+          <a:fillRef idx="0">
+            <a:schemeClr val="accent2"/>
+          </a:fillRef>
+          <a:effectRef idx="0">
+            <a:schemeClr val="accent2"/>
+          </a:effectRef>
+          <a:fontRef idx="minor">
+            <a:schemeClr val="tx1"/>
+          </a:fontRef>
+        </p:style>
+      </p:cxnSp>
+      <p:sp>
+        <p:nvSpPr>
+          <p:cNvPr id="54" name="TextBox 53">
+            <a:extLst>
+              <a:ext uri="{FF2B5EF4-FFF2-40B4-BE49-F238E27FC236}">
+                <a16:creationId xmlns:a16="http://schemas.microsoft.com/office/drawing/2014/main" id="{9E90EE19-1E67-43EB-AC2D-2FBB75105E5D}"/>
+              </a:ext>
+            </a:extLst>
+          </p:cNvPr>
+          <p:cNvSpPr txBox="1"/>
+          <p:nvPr/>
+        </p:nvSpPr>
+        <p:spPr>
+          <a:xfrm>
+            <a:off x="3650324" y="2357667"/>
+            <a:ext cx="771365" cy="338554"/>
+          </a:xfrm>
+          <a:prstGeom prst="rect">
+            <a:avLst/>
+          </a:prstGeom>
+          <a:noFill/>
+        </p:spPr>
+        <p:txBody>
+          <a:bodyPr wrap="none" rtlCol="0">
+            <a:spAutoFit/>
+          </a:bodyPr>
+          <a:lstStyle/>
+          <a:p>
+            <a:r>
+              <a:rPr lang="en-US" sz="1600" dirty="0">
+                <a:latin typeface="Times New Roman" panose="02020603050405020304" pitchFamily="18" charset="0"/>
+                <a:cs typeface="Times New Roman" panose="02020603050405020304" pitchFamily="18" charset="0"/>
+              </a:rPr>
+              <a:t>1 week</a:t>
+            </a:r>
+            <a:endParaRPr lang="en-IN" sz="1600" dirty="0">
+              <a:latin typeface="Times New Roman" panose="02020603050405020304" pitchFamily="18" charset="0"/>
+              <a:cs typeface="Times New Roman" panose="02020603050405020304" pitchFamily="18" charset="0"/>
+            </a:endParaRPr>
+          </a:p>
+        </p:txBody>
+      </p:sp>
+      <p:cxnSp>
+        <p:nvCxnSpPr>
+          <p:cNvPr id="55" name="Straight Arrow Connector 54">
+            <a:extLst>
+              <a:ext uri="{FF2B5EF4-FFF2-40B4-BE49-F238E27FC236}">
+                <a16:creationId xmlns:a16="http://schemas.microsoft.com/office/drawing/2014/main" id="{F28FF39C-0C90-43FD-911D-8A67AB104084}"/>
+              </a:ext>
+            </a:extLst>
+          </p:cNvPr>
+          <p:cNvCxnSpPr>
+            <a:cxnSpLocks/>
+          </p:cNvCxnSpPr>
+          <p:nvPr/>
+        </p:nvCxnSpPr>
+        <p:spPr>
+          <a:xfrm flipV="1">
+            <a:off x="3641442" y="2651715"/>
+            <a:ext cx="791102" cy="6482"/>
+          </a:xfrm>
+          <a:prstGeom prst="straightConnector1">
+            <a:avLst/>
+          </a:prstGeom>
+          <a:ln>
+            <a:headEnd type="triangle"/>
             <a:tailEnd type="triangle"/>
           </a:ln>
         </p:spPr>
@@ -3698,10 +3897,10 @@
       </p:cxnSp>
       <p:sp>
         <p:nvSpPr>
-          <p:cNvPr id="45" name="TextBox 44">
+          <p:cNvPr id="56" name="TextBox 55">
             <a:extLst>
               <a:ext uri="{FF2B5EF4-FFF2-40B4-BE49-F238E27FC236}">
-                <a16:creationId xmlns:a16="http://schemas.microsoft.com/office/drawing/2014/main" id="{8E2F0775-A030-4AF2-8D81-B518ADAEB3BE}"/>
+                <a16:creationId xmlns:a16="http://schemas.microsoft.com/office/drawing/2014/main" id="{4E1BAE29-55FB-4479-8DE1-0BB773B0A080}"/>
               </a:ext>
             </a:extLst>
           </p:cNvPr>
@@ -3710,8 +3909,8 @@
         </p:nvSpPr>
         <p:spPr>
           <a:xfrm>
-            <a:off x="2694962" y="911545"/>
-            <a:ext cx="813043" cy="523220"/>
+            <a:off x="3548498" y="2908382"/>
+            <a:ext cx="984244" cy="338554"/>
           </a:xfrm>
           <a:prstGeom prst="rect">
             <a:avLst/>
@@ -3725,30 +3924,18 @@
           <a:lstStyle/>
           <a:p>
             <a:r>
-              <a:rPr lang="en-US" sz="1400" dirty="0">
+              <a:rPr lang="en-US" sz="1600" dirty="0">
                 <a:solidFill>
-                  <a:schemeClr val="accent1"/>
+                  <a:srgbClr val="FF0000"/>
                 </a:solidFill>
                 <a:latin typeface="Times New Roman" panose="02020603050405020304" pitchFamily="18" charset="0"/>
                 <a:cs typeface="Times New Roman" panose="02020603050405020304" pitchFamily="18" charset="0"/>
               </a:rPr>
-              <a:t>Contact</a:t>
-            </a:r>
-          </a:p>
-          <a:p>
-            <a:r>
-              <a:rPr lang="en-US" sz="1400" dirty="0">
-                <a:solidFill>
-                  <a:schemeClr val="accent1"/>
-                </a:solidFill>
-                <a:latin typeface="Times New Roman" panose="02020603050405020304" pitchFamily="18" charset="0"/>
-                <a:cs typeface="Times New Roman" panose="02020603050405020304" pitchFamily="18" charset="0"/>
-              </a:rPr>
-              <a:t>Network</a:t>
-            </a:r>
-            <a:endParaRPr lang="en-IN" sz="1400" dirty="0">
+              <a:t>Vaccinate</a:t>
+            </a:r>
+            <a:endParaRPr lang="en-IN" sz="1600" dirty="0">
               <a:solidFill>
-                <a:schemeClr val="accent1"/>
+                <a:srgbClr val="FF0000"/>
               </a:solidFill>
               <a:latin typeface="Times New Roman" panose="02020603050405020304" pitchFamily="18" charset="0"/>
               <a:cs typeface="Times New Roman" panose="02020603050405020304" pitchFamily="18" charset="0"/>
@@ -3756,288 +3943,12 @@
           </a:p>
         </p:txBody>
       </p:sp>
-      <p:sp>
-        <p:nvSpPr>
-          <p:cNvPr id="46" name="TextBox 45">
+      <p:cxnSp>
+        <p:nvCxnSpPr>
+          <p:cNvPr id="58" name="Straight Arrow Connector 57">
             <a:extLst>
               <a:ext uri="{FF2B5EF4-FFF2-40B4-BE49-F238E27FC236}">
-                <a16:creationId xmlns:a16="http://schemas.microsoft.com/office/drawing/2014/main" id="{15FA3FC2-400A-4E0B-A627-2190536AACA4}"/>
-              </a:ext>
-            </a:extLst>
-          </p:cNvPr>
-          <p:cNvSpPr txBox="1"/>
-          <p:nvPr/>
-        </p:nvSpPr>
-        <p:spPr>
-          <a:xfrm>
-            <a:off x="3664185" y="907642"/>
-            <a:ext cx="813043" cy="523220"/>
-          </a:xfrm>
-          <a:prstGeom prst="rect">
-            <a:avLst/>
-          </a:prstGeom>
-          <a:noFill/>
-        </p:spPr>
-        <p:txBody>
-          <a:bodyPr wrap="none" rtlCol="0">
-            <a:spAutoFit/>
-          </a:bodyPr>
-          <a:lstStyle/>
-          <a:p>
-            <a:r>
-              <a:rPr lang="en-US" sz="1400" dirty="0">
-                <a:solidFill>
-                  <a:schemeClr val="accent1"/>
-                </a:solidFill>
-                <a:latin typeface="Times New Roman" panose="02020603050405020304" pitchFamily="18" charset="0"/>
-                <a:cs typeface="Times New Roman" panose="02020603050405020304" pitchFamily="18" charset="0"/>
-              </a:rPr>
-              <a:t>Contact</a:t>
-            </a:r>
-          </a:p>
-          <a:p>
-            <a:r>
-              <a:rPr lang="en-US" sz="1400" dirty="0">
-                <a:solidFill>
-                  <a:schemeClr val="accent1"/>
-                </a:solidFill>
-                <a:latin typeface="Times New Roman" panose="02020603050405020304" pitchFamily="18" charset="0"/>
-                <a:cs typeface="Times New Roman" panose="02020603050405020304" pitchFamily="18" charset="0"/>
-              </a:rPr>
-              <a:t>Network</a:t>
-            </a:r>
-            <a:endParaRPr lang="en-IN" sz="1400" dirty="0">
-              <a:solidFill>
-                <a:schemeClr val="accent1"/>
-              </a:solidFill>
-              <a:latin typeface="Times New Roman" panose="02020603050405020304" pitchFamily="18" charset="0"/>
-              <a:cs typeface="Times New Roman" panose="02020603050405020304" pitchFamily="18" charset="0"/>
-            </a:endParaRPr>
-          </a:p>
-        </p:txBody>
-      </p:sp>
-      <p:sp>
-        <p:nvSpPr>
-          <p:cNvPr id="47" name="TextBox 46">
-            <a:extLst>
-              <a:ext uri="{FF2B5EF4-FFF2-40B4-BE49-F238E27FC236}">
-                <a16:creationId xmlns:a16="http://schemas.microsoft.com/office/drawing/2014/main" id="{FA9703B5-1617-40E3-8F5C-7F2CA3D63A3E}"/>
-              </a:ext>
-            </a:extLst>
-          </p:cNvPr>
-          <p:cNvSpPr txBox="1"/>
-          <p:nvPr/>
-        </p:nvSpPr>
-        <p:spPr>
-          <a:xfrm>
-            <a:off x="4663169" y="923054"/>
-            <a:ext cx="813043" cy="523220"/>
-          </a:xfrm>
-          <a:prstGeom prst="rect">
-            <a:avLst/>
-          </a:prstGeom>
-          <a:noFill/>
-        </p:spPr>
-        <p:txBody>
-          <a:bodyPr wrap="none" rtlCol="0">
-            <a:spAutoFit/>
-          </a:bodyPr>
-          <a:lstStyle/>
-          <a:p>
-            <a:r>
-              <a:rPr lang="en-US" sz="1400" dirty="0">
-                <a:solidFill>
-                  <a:schemeClr val="accent1"/>
-                </a:solidFill>
-                <a:latin typeface="Times New Roman" panose="02020603050405020304" pitchFamily="18" charset="0"/>
-                <a:cs typeface="Times New Roman" panose="02020603050405020304" pitchFamily="18" charset="0"/>
-              </a:rPr>
-              <a:t>Contact</a:t>
-            </a:r>
-          </a:p>
-          <a:p>
-            <a:r>
-              <a:rPr lang="en-US" sz="1400" dirty="0">
-                <a:solidFill>
-                  <a:schemeClr val="accent1"/>
-                </a:solidFill>
-                <a:latin typeface="Times New Roman" panose="02020603050405020304" pitchFamily="18" charset="0"/>
-                <a:cs typeface="Times New Roman" panose="02020603050405020304" pitchFamily="18" charset="0"/>
-              </a:rPr>
-              <a:t>Network</a:t>
-            </a:r>
-            <a:endParaRPr lang="en-IN" sz="1400" dirty="0">
-              <a:solidFill>
-                <a:schemeClr val="accent1"/>
-              </a:solidFill>
-              <a:latin typeface="Times New Roman" panose="02020603050405020304" pitchFamily="18" charset="0"/>
-              <a:cs typeface="Times New Roman" panose="02020603050405020304" pitchFamily="18" charset="0"/>
-            </a:endParaRPr>
-          </a:p>
-        </p:txBody>
-      </p:sp>
-      <p:sp>
-        <p:nvSpPr>
-          <p:cNvPr id="48" name="TextBox 47">
-            <a:extLst>
-              <a:ext uri="{FF2B5EF4-FFF2-40B4-BE49-F238E27FC236}">
-                <a16:creationId xmlns:a16="http://schemas.microsoft.com/office/drawing/2014/main" id="{0E549B93-C543-4E82-9CAC-16898F566A9D}"/>
-              </a:ext>
-            </a:extLst>
-          </p:cNvPr>
-          <p:cNvSpPr txBox="1"/>
-          <p:nvPr/>
-        </p:nvSpPr>
-        <p:spPr>
-          <a:xfrm>
-            <a:off x="3583988" y="1700407"/>
-            <a:ext cx="604654" cy="307777"/>
-          </a:xfrm>
-          <a:prstGeom prst="rect">
-            <a:avLst/>
-          </a:prstGeom>
-          <a:noFill/>
-        </p:spPr>
-        <p:txBody>
-          <a:bodyPr wrap="square" rtlCol="0">
-            <a:spAutoFit/>
-          </a:bodyPr>
-          <a:lstStyle/>
-          <a:p>
-            <a:r>
-              <a:rPr lang="en-US" sz="1400" dirty="0">
-                <a:solidFill>
-                  <a:schemeClr val="accent6">
-                    <a:lumMod val="75000"/>
-                  </a:schemeClr>
-                </a:solidFill>
-                <a:latin typeface="Times New Roman" panose="02020603050405020304" pitchFamily="18" charset="0"/>
-                <a:cs typeface="Times New Roman" panose="02020603050405020304" pitchFamily="18" charset="0"/>
-              </a:rPr>
-              <a:t>Seeds</a:t>
-            </a:r>
-            <a:endParaRPr lang="en-IN" sz="1400" dirty="0">
-              <a:solidFill>
-                <a:schemeClr val="accent6">
-                  <a:lumMod val="75000"/>
-                </a:schemeClr>
-              </a:solidFill>
-              <a:latin typeface="Times New Roman" panose="02020603050405020304" pitchFamily="18" charset="0"/>
-              <a:cs typeface="Times New Roman" panose="02020603050405020304" pitchFamily="18" charset="0"/>
-            </a:endParaRPr>
-          </a:p>
-        </p:txBody>
-      </p:sp>
-      <p:sp>
-        <p:nvSpPr>
-          <p:cNvPr id="49" name="TextBox 48">
-            <a:extLst>
-              <a:ext uri="{FF2B5EF4-FFF2-40B4-BE49-F238E27FC236}">
-                <a16:creationId xmlns:a16="http://schemas.microsoft.com/office/drawing/2014/main" id="{70F07472-9DD4-4B04-BB00-0C28331DF1A1}"/>
-              </a:ext>
-            </a:extLst>
-          </p:cNvPr>
-          <p:cNvSpPr txBox="1"/>
-          <p:nvPr/>
-        </p:nvSpPr>
-        <p:spPr>
-          <a:xfrm>
-            <a:off x="4564457" y="1704386"/>
-            <a:ext cx="604654" cy="307777"/>
-          </a:xfrm>
-          <a:prstGeom prst="rect">
-            <a:avLst/>
-          </a:prstGeom>
-          <a:noFill/>
-        </p:spPr>
-        <p:txBody>
-          <a:bodyPr wrap="square" rtlCol="0">
-            <a:spAutoFit/>
-          </a:bodyPr>
-          <a:lstStyle/>
-          <a:p>
-            <a:r>
-              <a:rPr lang="en-US" sz="1400" dirty="0">
-                <a:solidFill>
-                  <a:schemeClr val="accent6">
-                    <a:lumMod val="75000"/>
-                  </a:schemeClr>
-                </a:solidFill>
-                <a:latin typeface="Times New Roman" panose="02020603050405020304" pitchFamily="18" charset="0"/>
-                <a:cs typeface="Times New Roman" panose="02020603050405020304" pitchFamily="18" charset="0"/>
-              </a:rPr>
-              <a:t>Seeds</a:t>
-            </a:r>
-            <a:endParaRPr lang="en-IN" sz="1400" dirty="0">
-              <a:solidFill>
-                <a:schemeClr val="accent6">
-                  <a:lumMod val="75000"/>
-                </a:schemeClr>
-              </a:solidFill>
-              <a:latin typeface="Times New Roman" panose="02020603050405020304" pitchFamily="18" charset="0"/>
-              <a:cs typeface="Times New Roman" panose="02020603050405020304" pitchFamily="18" charset="0"/>
-            </a:endParaRPr>
-          </a:p>
-        </p:txBody>
-      </p:sp>
-      <p:sp>
-        <p:nvSpPr>
-          <p:cNvPr id="50" name="TextBox 49">
-            <a:extLst>
-              <a:ext uri="{FF2B5EF4-FFF2-40B4-BE49-F238E27FC236}">
-                <a16:creationId xmlns:a16="http://schemas.microsoft.com/office/drawing/2014/main" id="{B7B453ED-9249-4E4B-8FA2-C94C32BFC87E}"/>
-              </a:ext>
-            </a:extLst>
-          </p:cNvPr>
-          <p:cNvSpPr txBox="1"/>
-          <p:nvPr/>
-        </p:nvSpPr>
-        <p:spPr>
-          <a:xfrm>
-            <a:off x="5541236" y="1698912"/>
-            <a:ext cx="604654" cy="307777"/>
-          </a:xfrm>
-          <a:prstGeom prst="rect">
-            <a:avLst/>
-          </a:prstGeom>
-          <a:noFill/>
-        </p:spPr>
-        <p:txBody>
-          <a:bodyPr wrap="square" rtlCol="0">
-            <a:spAutoFit/>
-          </a:bodyPr>
-          <a:lstStyle/>
-          <a:p>
-            <a:r>
-              <a:rPr lang="en-US" sz="1400" dirty="0">
-                <a:solidFill>
-                  <a:schemeClr val="accent6">
-                    <a:lumMod val="75000"/>
-                  </a:schemeClr>
-                </a:solidFill>
-                <a:latin typeface="Times New Roman" panose="02020603050405020304" pitchFamily="18" charset="0"/>
-                <a:cs typeface="Times New Roman" panose="02020603050405020304" pitchFamily="18" charset="0"/>
-              </a:rPr>
-              <a:t>Seeds</a:t>
-            </a:r>
-            <a:endParaRPr lang="en-IN" sz="1400" dirty="0">
-              <a:solidFill>
-                <a:schemeClr val="accent6">
-                  <a:lumMod val="75000"/>
-                </a:schemeClr>
-              </a:solidFill>
-              <a:latin typeface="Times New Roman" panose="02020603050405020304" pitchFamily="18" charset="0"/>
-              <a:cs typeface="Times New Roman" panose="02020603050405020304" pitchFamily="18" charset="0"/>
-            </a:endParaRPr>
-          </a:p>
-        </p:txBody>
-      </p:sp>
-      <p:cxnSp>
-        <p:nvCxnSpPr>
-          <p:cNvPr id="51" name="Straight Arrow Connector 50">
-            <a:extLst>
-              <a:ext uri="{FF2B5EF4-FFF2-40B4-BE49-F238E27FC236}">
-                <a16:creationId xmlns:a16="http://schemas.microsoft.com/office/drawing/2014/main" id="{69016D2E-2FCA-402A-9714-D2FC24B99B5D}"/>
+                <a16:creationId xmlns:a16="http://schemas.microsoft.com/office/drawing/2014/main" id="{85495FD2-C917-4573-8F4F-84BA6C6933E9}"/>
               </a:ext>
             </a:extLst>
           </p:cNvPr>
@@ -4047,9 +3958,95 @@
           <p:nvPr/>
         </p:nvCxnSpPr>
         <p:spPr>
-          <a:xfrm>
-            <a:off x="3641442" y="2038814"/>
+          <a:xfrm flipV="1">
+            <a:off x="4432544" y="2038814"/>
             <a:ext cx="0" cy="1240078"/>
+          </a:xfrm>
+          <a:prstGeom prst="straightConnector1">
+            <a:avLst/>
+          </a:prstGeom>
+          <a:ln>
+            <a:solidFill>
+              <a:schemeClr val="tx1"/>
+            </a:solidFill>
+            <a:tailEnd type="triangle"/>
+          </a:ln>
+        </p:spPr>
+        <p:style>
+          <a:lnRef idx="1">
+            <a:schemeClr val="accent1"/>
+          </a:lnRef>
+          <a:fillRef idx="0">
+            <a:schemeClr val="accent1"/>
+          </a:fillRef>
+          <a:effectRef idx="0">
+            <a:schemeClr val="accent1"/>
+          </a:effectRef>
+          <a:fontRef idx="minor">
+            <a:schemeClr val="tx1"/>
+          </a:fontRef>
+        </p:style>
+      </p:cxnSp>
+      <p:sp>
+        <p:nvSpPr>
+          <p:cNvPr id="59" name="TextBox 58">
+            <a:extLst>
+              <a:ext uri="{FF2B5EF4-FFF2-40B4-BE49-F238E27FC236}">
+                <a16:creationId xmlns:a16="http://schemas.microsoft.com/office/drawing/2014/main" id="{FA8B4E08-4919-4C43-AE84-4922733C4507}"/>
+              </a:ext>
+            </a:extLst>
+          </p:cNvPr>
+          <p:cNvSpPr txBox="1"/>
+          <p:nvPr/>
+        </p:nvSpPr>
+        <p:spPr>
+          <a:xfrm>
+            <a:off x="3963396" y="2050306"/>
+            <a:ext cx="516488" cy="338554"/>
+          </a:xfrm>
+          <a:prstGeom prst="rect">
+            <a:avLst/>
+          </a:prstGeom>
+          <a:noFill/>
+        </p:spPr>
+        <p:txBody>
+          <a:bodyPr wrap="none" rtlCol="0">
+            <a:spAutoFit/>
+          </a:bodyPr>
+          <a:lstStyle/>
+          <a:p>
+            <a:r>
+              <a:rPr lang="en-US" sz="1600" dirty="0">
+                <a:latin typeface="Times New Roman" panose="02020603050405020304" pitchFamily="18" charset="0"/>
+                <a:cs typeface="Times New Roman" panose="02020603050405020304" pitchFamily="18" charset="0"/>
+              </a:rPr>
+              <a:t>Sim</a:t>
+            </a:r>
+            <a:endParaRPr lang="en-IN" sz="1600" dirty="0">
+              <a:latin typeface="Times New Roman" panose="02020603050405020304" pitchFamily="18" charset="0"/>
+              <a:cs typeface="Times New Roman" panose="02020603050405020304" pitchFamily="18" charset="0"/>
+            </a:endParaRPr>
+          </a:p>
+        </p:txBody>
+      </p:sp>
+      <p:cxnSp>
+        <p:nvCxnSpPr>
+          <p:cNvPr id="60" name="Straight Arrow Connector 59">
+            <a:extLst>
+              <a:ext uri="{FF2B5EF4-FFF2-40B4-BE49-F238E27FC236}">
+                <a16:creationId xmlns:a16="http://schemas.microsoft.com/office/drawing/2014/main" id="{4FB2D464-3378-4090-801A-E8CF421DA995}"/>
+              </a:ext>
+            </a:extLst>
+          </p:cNvPr>
+          <p:cNvCxnSpPr>
+            <a:cxnSpLocks/>
+          </p:cNvCxnSpPr>
+          <p:nvPr/>
+        </p:nvCxnSpPr>
+        <p:spPr>
+          <a:xfrm>
+            <a:off x="4617221" y="2031952"/>
+            <a:ext cx="576" cy="1246945"/>
           </a:xfrm>
           <a:prstGeom prst="straightConnector1">
             <a:avLst/>
@@ -4078,10 +4075,10 @@
       </p:cxnSp>
       <p:sp>
         <p:nvSpPr>
-          <p:cNvPr id="54" name="TextBox 53">
+          <p:cNvPr id="61" name="TextBox 60">
             <a:extLst>
               <a:ext uri="{FF2B5EF4-FFF2-40B4-BE49-F238E27FC236}">
-                <a16:creationId xmlns:a16="http://schemas.microsoft.com/office/drawing/2014/main" id="{9E90EE19-1E67-43EB-AC2D-2FBB75105E5D}"/>
+                <a16:creationId xmlns:a16="http://schemas.microsoft.com/office/drawing/2014/main" id="{1E47989D-FADA-4291-A730-5E6E6BAB516E}"/>
               </a:ext>
             </a:extLst>
           </p:cNvPr>
@@ -4090,8 +4087,8 @@
         </p:nvSpPr>
         <p:spPr>
           <a:xfrm>
-            <a:off x="3693454" y="2381420"/>
-            <a:ext cx="699230" cy="307777"/>
+            <a:off x="4525373" y="2908382"/>
+            <a:ext cx="984244" cy="338554"/>
           </a:xfrm>
           <a:prstGeom prst="rect">
             <a:avLst/>
@@ -4105,13 +4102,19 @@
           <a:lstStyle/>
           <a:p>
             <a:r>
-              <a:rPr lang="en-US" sz="1400" dirty="0">
+              <a:rPr lang="en-US" sz="1600" dirty="0">
+                <a:solidFill>
+                  <a:srgbClr val="FF0000"/>
+                </a:solidFill>
                 <a:latin typeface="Times New Roman" panose="02020603050405020304" pitchFamily="18" charset="0"/>
                 <a:cs typeface="Times New Roman" panose="02020603050405020304" pitchFamily="18" charset="0"/>
               </a:rPr>
-              <a:t>1 week</a:t>
-            </a:r>
-            <a:endParaRPr lang="en-IN" sz="1400" dirty="0">
+              <a:t>Vaccinate</a:t>
+            </a:r>
+            <a:endParaRPr lang="en-IN" sz="1600" dirty="0">
+              <a:solidFill>
+                <a:srgbClr val="FF0000"/>
+              </a:solidFill>
               <a:latin typeface="Times New Roman" panose="02020603050405020304" pitchFamily="18" charset="0"/>
               <a:cs typeface="Times New Roman" panose="02020603050405020304" pitchFamily="18" charset="0"/>
             </a:endParaRPr>
@@ -4120,10 +4123,10 @@
       </p:sp>
       <p:cxnSp>
         <p:nvCxnSpPr>
-          <p:cNvPr id="55" name="Straight Arrow Connector 54">
+          <p:cNvPr id="62" name="Straight Arrow Connector 61">
             <a:extLst>
               <a:ext uri="{FF2B5EF4-FFF2-40B4-BE49-F238E27FC236}">
-                <a16:creationId xmlns:a16="http://schemas.microsoft.com/office/drawing/2014/main" id="{F28FF39C-0C90-43FD-911D-8A67AB104084}"/>
+                <a16:creationId xmlns:a16="http://schemas.microsoft.com/office/drawing/2014/main" id="{653AFE20-9B4A-44F3-A728-FDC3F1582821}"/>
               </a:ext>
             </a:extLst>
           </p:cNvPr>
@@ -4134,98 +4137,8 @@
         </p:nvCxnSpPr>
         <p:spPr>
           <a:xfrm flipV="1">
-            <a:off x="3641442" y="2657731"/>
-            <a:ext cx="791102" cy="6482"/>
-          </a:xfrm>
-          <a:prstGeom prst="straightConnector1">
-            <a:avLst/>
-          </a:prstGeom>
-          <a:ln>
-            <a:headEnd type="triangle"/>
-            <a:tailEnd type="triangle"/>
-          </a:ln>
-        </p:spPr>
-        <p:style>
-          <a:lnRef idx="1">
-            <a:schemeClr val="dk1"/>
-          </a:lnRef>
-          <a:fillRef idx="0">
-            <a:schemeClr val="dk1"/>
-          </a:fillRef>
-          <a:effectRef idx="0">
-            <a:schemeClr val="dk1"/>
-          </a:effectRef>
-          <a:fontRef idx="minor">
-            <a:schemeClr val="tx1"/>
-          </a:fontRef>
-        </p:style>
-      </p:cxnSp>
-      <p:sp>
-        <p:nvSpPr>
-          <p:cNvPr id="56" name="TextBox 55">
-            <a:extLst>
-              <a:ext uri="{FF2B5EF4-FFF2-40B4-BE49-F238E27FC236}">
-                <a16:creationId xmlns:a16="http://schemas.microsoft.com/office/drawing/2014/main" id="{4E1BAE29-55FB-4479-8DE1-0BB773B0A080}"/>
-              </a:ext>
-            </a:extLst>
-          </p:cNvPr>
-          <p:cNvSpPr txBox="1"/>
-          <p:nvPr/>
-        </p:nvSpPr>
-        <p:spPr>
-          <a:xfrm>
-            <a:off x="3572562" y="2908382"/>
-            <a:ext cx="884538" cy="307777"/>
-          </a:xfrm>
-          <a:prstGeom prst="rect">
-            <a:avLst/>
-          </a:prstGeom>
-          <a:noFill/>
-        </p:spPr>
-        <p:txBody>
-          <a:bodyPr wrap="none" rtlCol="0">
-            <a:spAutoFit/>
-          </a:bodyPr>
-          <a:lstStyle/>
-          <a:p>
-            <a:r>
-              <a:rPr lang="en-US" sz="1400" dirty="0">
-                <a:solidFill>
-                  <a:srgbClr val="FF0000"/>
-                </a:solidFill>
-                <a:latin typeface="Times New Roman" panose="02020603050405020304" pitchFamily="18" charset="0"/>
-                <a:cs typeface="Times New Roman" panose="02020603050405020304" pitchFamily="18" charset="0"/>
-              </a:rPr>
-              <a:t>Vaccinate</a:t>
-            </a:r>
-            <a:endParaRPr lang="en-IN" sz="1400" dirty="0">
-              <a:solidFill>
-                <a:srgbClr val="FF0000"/>
-              </a:solidFill>
-              <a:latin typeface="Times New Roman" panose="02020603050405020304" pitchFamily="18" charset="0"/>
-              <a:cs typeface="Times New Roman" panose="02020603050405020304" pitchFamily="18" charset="0"/>
-            </a:endParaRPr>
-          </a:p>
-        </p:txBody>
-      </p:sp>
-      <p:cxnSp>
-        <p:nvCxnSpPr>
-          <p:cNvPr id="58" name="Straight Arrow Connector 57">
-            <a:extLst>
-              <a:ext uri="{FF2B5EF4-FFF2-40B4-BE49-F238E27FC236}">
-                <a16:creationId xmlns:a16="http://schemas.microsoft.com/office/drawing/2014/main" id="{85495FD2-C917-4573-8F4F-84BA6C6933E9}"/>
-              </a:ext>
-            </a:extLst>
-          </p:cNvPr>
-          <p:cNvCxnSpPr>
-            <a:cxnSpLocks/>
-          </p:cNvCxnSpPr>
-          <p:nvPr/>
-        </p:nvCxnSpPr>
-        <p:spPr>
-          <a:xfrm flipV="1">
-            <a:off x="4432544" y="2038814"/>
-            <a:ext cx="0" cy="1240078"/>
+            <a:off x="5407340" y="2031949"/>
+            <a:ext cx="1984" cy="1244700"/>
           </a:xfrm>
           <a:prstGeom prst="straightConnector1">
             <a:avLst/>
@@ -4254,10 +4167,10 @@
       </p:cxnSp>
       <p:sp>
         <p:nvSpPr>
-          <p:cNvPr id="59" name="TextBox 58">
+          <p:cNvPr id="63" name="TextBox 62">
             <a:extLst>
               <a:ext uri="{FF2B5EF4-FFF2-40B4-BE49-F238E27FC236}">
-                <a16:creationId xmlns:a16="http://schemas.microsoft.com/office/drawing/2014/main" id="{FA8B4E08-4919-4C43-AE84-4922733C4507}"/>
+                <a16:creationId xmlns:a16="http://schemas.microsoft.com/office/drawing/2014/main" id="{B30B5D94-66D3-4A23-8F64-27FCD5F6A605}"/>
               </a:ext>
             </a:extLst>
           </p:cNvPr>
@@ -4266,8 +4179,8 @@
         </p:nvSpPr>
         <p:spPr>
           <a:xfrm>
-            <a:off x="4023556" y="2050306"/>
-            <a:ext cx="473206" cy="307777"/>
+            <a:off x="4935152" y="2042797"/>
+            <a:ext cx="516488" cy="338554"/>
           </a:xfrm>
           <a:prstGeom prst="rect">
             <a:avLst/>
@@ -4281,13 +4194,13 @@
           <a:lstStyle/>
           <a:p>
             <a:r>
-              <a:rPr lang="en-US" sz="1400" dirty="0">
+              <a:rPr lang="en-US" sz="1600" dirty="0">
                 <a:latin typeface="Times New Roman" panose="02020603050405020304" pitchFamily="18" charset="0"/>
                 <a:cs typeface="Times New Roman" panose="02020603050405020304" pitchFamily="18" charset="0"/>
               </a:rPr>
               <a:t>Sim</a:t>
             </a:r>
-            <a:endParaRPr lang="en-IN" sz="1400" dirty="0">
+            <a:endParaRPr lang="en-IN" sz="1600" dirty="0">
               <a:latin typeface="Times New Roman" panose="02020603050405020304" pitchFamily="18" charset="0"/>
               <a:cs typeface="Times New Roman" panose="02020603050405020304" pitchFamily="18" charset="0"/>
             </a:endParaRPr>
@@ -4296,10 +4209,10 @@
       </p:sp>
       <p:cxnSp>
         <p:nvCxnSpPr>
-          <p:cNvPr id="60" name="Straight Arrow Connector 59">
+          <p:cNvPr id="74" name="Straight Arrow Connector 73">
             <a:extLst>
               <a:ext uri="{FF2B5EF4-FFF2-40B4-BE49-F238E27FC236}">
-                <a16:creationId xmlns:a16="http://schemas.microsoft.com/office/drawing/2014/main" id="{4FB2D464-3378-4090-801A-E8CF421DA995}"/>
+                <a16:creationId xmlns:a16="http://schemas.microsoft.com/office/drawing/2014/main" id="{43E6F8F9-7CDC-45F1-B1C5-5C999F36C803}"/>
               </a:ext>
             </a:extLst>
           </p:cNvPr>
@@ -4310,8 +4223,8 @@
         </p:nvCxnSpPr>
         <p:spPr>
           <a:xfrm>
-            <a:off x="4617221" y="2031952"/>
-            <a:ext cx="576" cy="1246945"/>
+            <a:off x="5594098" y="2031948"/>
+            <a:ext cx="0" cy="1251568"/>
           </a:xfrm>
           <a:prstGeom prst="straightConnector1">
             <a:avLst/>
@@ -4340,184 +4253,6 @@
       </p:cxnSp>
       <p:sp>
         <p:nvSpPr>
-          <p:cNvPr id="61" name="TextBox 60">
-            <a:extLst>
-              <a:ext uri="{FF2B5EF4-FFF2-40B4-BE49-F238E27FC236}">
-                <a16:creationId xmlns:a16="http://schemas.microsoft.com/office/drawing/2014/main" id="{1E47989D-FADA-4291-A730-5E6E6BAB516E}"/>
-              </a:ext>
-            </a:extLst>
-          </p:cNvPr>
-          <p:cNvSpPr txBox="1"/>
-          <p:nvPr/>
-        </p:nvSpPr>
-        <p:spPr>
-          <a:xfrm>
-            <a:off x="4549437" y="2908382"/>
-            <a:ext cx="884538" cy="307777"/>
-          </a:xfrm>
-          <a:prstGeom prst="rect">
-            <a:avLst/>
-          </a:prstGeom>
-          <a:noFill/>
-        </p:spPr>
-        <p:txBody>
-          <a:bodyPr wrap="none" rtlCol="0">
-            <a:spAutoFit/>
-          </a:bodyPr>
-          <a:lstStyle/>
-          <a:p>
-            <a:r>
-              <a:rPr lang="en-US" sz="1400" dirty="0">
-                <a:solidFill>
-                  <a:srgbClr val="FF0000"/>
-                </a:solidFill>
-                <a:latin typeface="Times New Roman" panose="02020603050405020304" pitchFamily="18" charset="0"/>
-                <a:cs typeface="Times New Roman" panose="02020603050405020304" pitchFamily="18" charset="0"/>
-              </a:rPr>
-              <a:t>Vaccinate</a:t>
-            </a:r>
-            <a:endParaRPr lang="en-IN" sz="1400" dirty="0">
-              <a:solidFill>
-                <a:srgbClr val="FF0000"/>
-              </a:solidFill>
-              <a:latin typeface="Times New Roman" panose="02020603050405020304" pitchFamily="18" charset="0"/>
-              <a:cs typeface="Times New Roman" panose="02020603050405020304" pitchFamily="18" charset="0"/>
-            </a:endParaRPr>
-          </a:p>
-        </p:txBody>
-      </p:sp>
-      <p:cxnSp>
-        <p:nvCxnSpPr>
-          <p:cNvPr id="62" name="Straight Arrow Connector 61">
-            <a:extLst>
-              <a:ext uri="{FF2B5EF4-FFF2-40B4-BE49-F238E27FC236}">
-                <a16:creationId xmlns:a16="http://schemas.microsoft.com/office/drawing/2014/main" id="{653AFE20-9B4A-44F3-A728-FDC3F1582821}"/>
-              </a:ext>
-            </a:extLst>
-          </p:cNvPr>
-          <p:cNvCxnSpPr>
-            <a:cxnSpLocks/>
-          </p:cNvCxnSpPr>
-          <p:nvPr/>
-        </p:nvCxnSpPr>
-        <p:spPr>
-          <a:xfrm flipV="1">
-            <a:off x="5407340" y="2031949"/>
-            <a:ext cx="1984" cy="1244700"/>
-          </a:xfrm>
-          <a:prstGeom prst="straightConnector1">
-            <a:avLst/>
-          </a:prstGeom>
-          <a:ln>
-            <a:solidFill>
-              <a:schemeClr val="tx1"/>
-            </a:solidFill>
-            <a:tailEnd type="triangle"/>
-          </a:ln>
-        </p:spPr>
-        <p:style>
-          <a:lnRef idx="1">
-            <a:schemeClr val="accent1"/>
-          </a:lnRef>
-          <a:fillRef idx="0">
-            <a:schemeClr val="accent1"/>
-          </a:fillRef>
-          <a:effectRef idx="0">
-            <a:schemeClr val="accent1"/>
-          </a:effectRef>
-          <a:fontRef idx="minor">
-            <a:schemeClr val="tx1"/>
-          </a:fontRef>
-        </p:style>
-      </p:cxnSp>
-      <p:sp>
-        <p:nvSpPr>
-          <p:cNvPr id="63" name="TextBox 62">
-            <a:extLst>
-              <a:ext uri="{FF2B5EF4-FFF2-40B4-BE49-F238E27FC236}">
-                <a16:creationId xmlns:a16="http://schemas.microsoft.com/office/drawing/2014/main" id="{B30B5D94-66D3-4A23-8F64-27FCD5F6A605}"/>
-              </a:ext>
-            </a:extLst>
-          </p:cNvPr>
-          <p:cNvSpPr txBox="1"/>
-          <p:nvPr/>
-        </p:nvSpPr>
-        <p:spPr>
-          <a:xfrm>
-            <a:off x="4995312" y="2042797"/>
-            <a:ext cx="473206" cy="307777"/>
-          </a:xfrm>
-          <a:prstGeom prst="rect">
-            <a:avLst/>
-          </a:prstGeom>
-          <a:noFill/>
-        </p:spPr>
-        <p:txBody>
-          <a:bodyPr wrap="none" rtlCol="0">
-            <a:spAutoFit/>
-          </a:bodyPr>
-          <a:lstStyle/>
-          <a:p>
-            <a:r>
-              <a:rPr lang="en-US" sz="1400" dirty="0">
-                <a:latin typeface="Times New Roman" panose="02020603050405020304" pitchFamily="18" charset="0"/>
-                <a:cs typeface="Times New Roman" panose="02020603050405020304" pitchFamily="18" charset="0"/>
-              </a:rPr>
-              <a:t>Sim</a:t>
-            </a:r>
-            <a:endParaRPr lang="en-IN" sz="1400" dirty="0">
-              <a:latin typeface="Times New Roman" panose="02020603050405020304" pitchFamily="18" charset="0"/>
-              <a:cs typeface="Times New Roman" panose="02020603050405020304" pitchFamily="18" charset="0"/>
-            </a:endParaRPr>
-          </a:p>
-        </p:txBody>
-      </p:sp>
-      <p:cxnSp>
-        <p:nvCxnSpPr>
-          <p:cNvPr id="74" name="Straight Arrow Connector 73">
-            <a:extLst>
-              <a:ext uri="{FF2B5EF4-FFF2-40B4-BE49-F238E27FC236}">
-                <a16:creationId xmlns:a16="http://schemas.microsoft.com/office/drawing/2014/main" id="{43E6F8F9-7CDC-45F1-B1C5-5C999F36C803}"/>
-              </a:ext>
-            </a:extLst>
-          </p:cNvPr>
-          <p:cNvCxnSpPr>
-            <a:cxnSpLocks/>
-          </p:cNvCxnSpPr>
-          <p:nvPr/>
-        </p:nvCxnSpPr>
-        <p:spPr>
-          <a:xfrm>
-            <a:off x="5594098" y="2031948"/>
-            <a:ext cx="0" cy="1251568"/>
-          </a:xfrm>
-          <a:prstGeom prst="straightConnector1">
-            <a:avLst/>
-          </a:prstGeom>
-          <a:ln>
-            <a:solidFill>
-              <a:srgbClr val="FF0000"/>
-            </a:solidFill>
-            <a:tailEnd type="triangle"/>
-          </a:ln>
-        </p:spPr>
-        <p:style>
-          <a:lnRef idx="1">
-            <a:schemeClr val="accent2"/>
-          </a:lnRef>
-          <a:fillRef idx="0">
-            <a:schemeClr val="accent2"/>
-          </a:fillRef>
-          <a:effectRef idx="0">
-            <a:schemeClr val="accent2"/>
-          </a:effectRef>
-          <a:fontRef idx="minor">
-            <a:schemeClr val="tx1"/>
-          </a:fontRef>
-        </p:style>
-      </p:cxnSp>
-      <p:sp>
-        <p:nvSpPr>
           <p:cNvPr id="75" name="TextBox 74">
             <a:extLst>
               <a:ext uri="{FF2B5EF4-FFF2-40B4-BE49-F238E27FC236}">
@@ -4530,8 +4265,8 @@
         </p:nvSpPr>
         <p:spPr>
           <a:xfrm>
-            <a:off x="5526313" y="2908382"/>
-            <a:ext cx="884538" cy="307777"/>
+            <a:off x="5502249" y="2908382"/>
+            <a:ext cx="984244" cy="338554"/>
           </a:xfrm>
           <a:prstGeom prst="rect">
             <a:avLst/>
@@ -4545,7 +4280,7 @@
           <a:lstStyle/>
           <a:p>
             <a:r>
-              <a:rPr lang="en-US" sz="1400" dirty="0">
+              <a:rPr lang="en-US" sz="1600" dirty="0">
                 <a:solidFill>
                   <a:srgbClr val="FF0000"/>
                 </a:solidFill>
@@ -4554,7 +4289,7 @@
               </a:rPr>
               <a:t>Vaccinate</a:t>
             </a:r>
-            <a:endParaRPr lang="en-IN" sz="1400" dirty="0">
+            <a:endParaRPr lang="en-IN" sz="1600" dirty="0">
               <a:solidFill>
                 <a:srgbClr val="FF0000"/>
               </a:solidFill>
@@ -4578,8 +4313,8 @@
         </p:nvSpPr>
         <p:spPr>
           <a:xfrm>
-            <a:off x="4669808" y="2371694"/>
-            <a:ext cx="699230" cy="307777"/>
+            <a:off x="4626886" y="2365398"/>
+            <a:ext cx="771365" cy="338554"/>
           </a:xfrm>
           <a:prstGeom prst="rect">
             <a:avLst/>
@@ -4593,13 +4328,13 @@
           <a:lstStyle/>
           <a:p>
             <a:r>
-              <a:rPr lang="en-US" sz="1400" dirty="0">
+              <a:rPr lang="en-US" sz="1600" dirty="0">
                 <a:latin typeface="Times New Roman" panose="02020603050405020304" pitchFamily="18" charset="0"/>
                 <a:cs typeface="Times New Roman" panose="02020603050405020304" pitchFamily="18" charset="0"/>
               </a:rPr>
               <a:t>1 week</a:t>
             </a:r>
-            <a:endParaRPr lang="en-IN" sz="1400" dirty="0">
+            <a:endParaRPr lang="en-IN" sz="1600" dirty="0">
               <a:latin typeface="Times New Roman" panose="02020603050405020304" pitchFamily="18" charset="0"/>
               <a:cs typeface="Times New Roman" panose="02020603050405020304" pitchFamily="18" charset="0"/>
             </a:endParaRPr>
@@ -4706,8 +4441,8 @@
         </p:nvSpPr>
         <p:spPr>
           <a:xfrm>
-            <a:off x="7925068" y="2039553"/>
-            <a:ext cx="473206" cy="307777"/>
+            <a:off x="7864908" y="2039553"/>
+            <a:ext cx="516488" cy="338554"/>
           </a:xfrm>
           <a:prstGeom prst="rect">
             <a:avLst/>
@@ -4721,13 +4456,13 @@
           <a:lstStyle/>
           <a:p>
             <a:r>
-              <a:rPr lang="en-US" sz="1400" dirty="0">
+              <a:rPr lang="en-US" sz="1600" dirty="0">
                 <a:latin typeface="Times New Roman" panose="02020603050405020304" pitchFamily="18" charset="0"/>
                 <a:cs typeface="Times New Roman" panose="02020603050405020304" pitchFamily="18" charset="0"/>
               </a:rPr>
               <a:t>Sim</a:t>
             </a:r>
-            <a:endParaRPr lang="en-IN" sz="1400" dirty="0">
+            <a:endParaRPr lang="en-IN" sz="1600" dirty="0">
               <a:latin typeface="Times New Roman" panose="02020603050405020304" pitchFamily="18" charset="0"/>
               <a:cs typeface="Times New Roman" panose="02020603050405020304" pitchFamily="18" charset="0"/>
             </a:endParaRPr>
@@ -4792,8 +4527,8 @@
         </p:nvSpPr>
         <p:spPr>
           <a:xfrm>
-            <a:off x="8456069" y="2905137"/>
-            <a:ext cx="884538" cy="307777"/>
+            <a:off x="8432005" y="2905137"/>
+            <a:ext cx="984244" cy="338554"/>
           </a:xfrm>
           <a:prstGeom prst="rect">
             <a:avLst/>
@@ -4807,7 +4542,7 @@
           <a:lstStyle/>
           <a:p>
             <a:r>
-              <a:rPr lang="en-US" sz="1400" dirty="0">
+              <a:rPr lang="en-US" sz="1600" dirty="0">
                 <a:solidFill>
                   <a:srgbClr val="FF0000"/>
                 </a:solidFill>
@@ -4816,7 +4551,7 @@
               </a:rPr>
               <a:t>Vaccinate</a:t>
             </a:r>
-            <a:endParaRPr lang="en-IN" sz="1400" dirty="0">
+            <a:endParaRPr lang="en-IN" sz="1600" dirty="0">
               <a:solidFill>
                 <a:srgbClr val="FF0000"/>
               </a:solidFill>
@@ -4957,8 +4692,8 @@
         </p:nvSpPr>
         <p:spPr>
           <a:xfrm>
-            <a:off x="3048760" y="2045684"/>
-            <a:ext cx="473206" cy="307777"/>
+            <a:off x="2988600" y="2045684"/>
+            <a:ext cx="516488" cy="338554"/>
           </a:xfrm>
           <a:prstGeom prst="rect">
             <a:avLst/>
@@ -4972,13 +4707,13 @@
           <a:lstStyle/>
           <a:p>
             <a:r>
-              <a:rPr lang="en-US" sz="1400" dirty="0">
+              <a:rPr lang="en-US" sz="1600" dirty="0">
                 <a:latin typeface="Times New Roman" panose="02020603050405020304" pitchFamily="18" charset="0"/>
                 <a:cs typeface="Times New Roman" panose="02020603050405020304" pitchFamily="18" charset="0"/>
               </a:rPr>
               <a:t>Sim</a:t>
             </a:r>
-            <a:endParaRPr lang="en-IN" sz="1400" dirty="0">
+            <a:endParaRPr lang="en-IN" sz="1600" dirty="0">
               <a:latin typeface="Times New Roman" panose="02020603050405020304" pitchFamily="18" charset="0"/>
               <a:cs typeface="Times New Roman" panose="02020603050405020304" pitchFamily="18" charset="0"/>
             </a:endParaRPr>
@@ -5051,7 +4786,7 @@
           <a:prstGeom prst="straightConnector1">
             <a:avLst/>
           </a:prstGeom>
-          <a:ln>
+          <a:ln w="28575">
             <a:solidFill>
               <a:srgbClr val="7030A0"/>
             </a:solidFill>
@@ -5129,8 +4864,8 @@
         </p:nvSpPr>
         <p:spPr>
           <a:xfrm>
-            <a:off x="289639" y="2113040"/>
-            <a:ext cx="1088760" cy="1077218"/>
+            <a:off x="205545" y="2046327"/>
+            <a:ext cx="1197764" cy="1200329"/>
           </a:xfrm>
           <a:prstGeom prst="rect">
             <a:avLst/>
@@ -5144,7 +4879,7 @@
           <a:lstStyle/>
           <a:p>
             <a:r>
-              <a:rPr lang="en-US" sz="1600" dirty="0">
+              <a:rPr lang="en-US" dirty="0">
                 <a:latin typeface="Times New Roman" panose="02020603050405020304" pitchFamily="18" charset="0"/>
                 <a:cs typeface="Times New Roman" panose="02020603050405020304" pitchFamily="18" charset="0"/>
               </a:rPr>
@@ -5153,7 +4888,7 @@
           </a:p>
           <a:p>
             <a:r>
-              <a:rPr lang="en-US" sz="1600" dirty="0">
+              <a:rPr lang="en-US" dirty="0">
                 <a:latin typeface="Times New Roman" panose="02020603050405020304" pitchFamily="18" charset="0"/>
                 <a:cs typeface="Times New Roman" panose="02020603050405020304" pitchFamily="18" charset="0"/>
               </a:rPr>
@@ -5162,7 +4897,7 @@
           </a:p>
           <a:p>
             <a:r>
-              <a:rPr lang="en-US" sz="1600" dirty="0">
+              <a:rPr lang="en-US" dirty="0">
                 <a:latin typeface="Times New Roman" panose="02020603050405020304" pitchFamily="18" charset="0"/>
                 <a:cs typeface="Times New Roman" panose="02020603050405020304" pitchFamily="18" charset="0"/>
               </a:rPr>
@@ -5171,13 +4906,13 @@
           </a:p>
           <a:p>
             <a:r>
-              <a:rPr lang="en-US" sz="1600" dirty="0">
+              <a:rPr lang="en-US" dirty="0">
                 <a:latin typeface="Times New Roman" panose="02020603050405020304" pitchFamily="18" charset="0"/>
                 <a:cs typeface="Times New Roman" panose="02020603050405020304" pitchFamily="18" charset="0"/>
               </a:rPr>
               <a:t>Pop size)</a:t>
             </a:r>
-            <a:endParaRPr lang="en-IN" sz="1600" dirty="0">
+            <a:endParaRPr lang="en-IN" dirty="0">
               <a:latin typeface="Times New Roman" panose="02020603050405020304" pitchFamily="18" charset="0"/>
               <a:cs typeface="Times New Roman" panose="02020603050405020304" pitchFamily="18" charset="0"/>
             </a:endParaRPr>
@@ -5245,8 +4980,8 @@
         </p:nvSpPr>
         <p:spPr>
           <a:xfrm>
-            <a:off x="9086580" y="3229682"/>
-            <a:ext cx="1540806" cy="584775"/>
+            <a:off x="8986982" y="3457032"/>
+            <a:ext cx="1704313" cy="646331"/>
           </a:xfrm>
           <a:prstGeom prst="rect">
             <a:avLst/>
@@ -5260,7 +4995,7 @@
           <a:lstStyle/>
           <a:p>
             <a:r>
-              <a:rPr lang="en-US" sz="1600" dirty="0">
+              <a:rPr lang="en-US" dirty="0">
                 <a:latin typeface="Times New Roman" panose="02020603050405020304" pitchFamily="18" charset="0"/>
                 <a:cs typeface="Times New Roman" panose="02020603050405020304" pitchFamily="18" charset="0"/>
               </a:rPr>
@@ -5269,13 +5004,13 @@
           </a:p>
           <a:p>
             <a:r>
-              <a:rPr lang="en-US" sz="1600" dirty="0">
+              <a:rPr lang="en-US" dirty="0">
                 <a:latin typeface="Times New Roman" panose="02020603050405020304" pitchFamily="18" charset="0"/>
                 <a:cs typeface="Times New Roman" panose="02020603050405020304" pitchFamily="18" charset="0"/>
               </a:rPr>
               <a:t>from Simulation</a:t>
             </a:r>
-            <a:endParaRPr lang="en-IN" sz="1600" dirty="0">
+            <a:endParaRPr lang="en-IN" dirty="0">
               <a:latin typeface="Times New Roman" panose="02020603050405020304" pitchFamily="18" charset="0"/>
               <a:cs typeface="Times New Roman" panose="02020603050405020304" pitchFamily="18" charset="0"/>
             </a:endParaRPr>
@@ -5296,8 +5031,8 @@
         </p:nvSpPr>
         <p:spPr>
           <a:xfrm>
-            <a:off x="9969415" y="1731040"/>
-            <a:ext cx="604654" cy="307777"/>
+            <a:off x="9969414" y="1731040"/>
+            <a:ext cx="794329" cy="338554"/>
           </a:xfrm>
           <a:prstGeom prst="rect">
             <a:avLst/>
@@ -5311,7 +5046,7 @@
           <a:lstStyle/>
           <a:p>
             <a:r>
-              <a:rPr lang="en-US" sz="1400" dirty="0">
+              <a:rPr lang="en-US" sz="1600" dirty="0">
                 <a:solidFill>
                   <a:srgbClr val="7030A0"/>
                 </a:solidFill>
@@ -5320,9 +5055,615 @@
               </a:rPr>
               <a:t>Time</a:t>
             </a:r>
-            <a:endParaRPr lang="en-IN" sz="1400" dirty="0">
+            <a:endParaRPr lang="en-IN" sz="1600" dirty="0">
               <a:solidFill>
                 <a:srgbClr val="7030A0"/>
+              </a:solidFill>
+              <a:latin typeface="Times New Roman" panose="02020603050405020304" pitchFamily="18" charset="0"/>
+              <a:cs typeface="Times New Roman" panose="02020603050405020304" pitchFamily="18" charset="0"/>
+            </a:endParaRPr>
+          </a:p>
+        </p:txBody>
+      </p:sp>
+      <p:cxnSp>
+        <p:nvCxnSpPr>
+          <p:cNvPr id="52" name="Straight Arrow Connector 51">
+            <a:extLst>
+              <a:ext uri="{FF2B5EF4-FFF2-40B4-BE49-F238E27FC236}">
+                <a16:creationId xmlns:a16="http://schemas.microsoft.com/office/drawing/2014/main" id="{63E0A239-1F4C-4BDF-BF29-91D87D491B66}"/>
+              </a:ext>
+            </a:extLst>
+          </p:cNvPr>
+          <p:cNvCxnSpPr>
+            <a:cxnSpLocks/>
+          </p:cNvCxnSpPr>
+          <p:nvPr/>
+        </p:nvCxnSpPr>
+        <p:spPr>
+          <a:xfrm flipV="1">
+            <a:off x="3455928" y="957234"/>
+            <a:ext cx="0" cy="1077440"/>
+          </a:xfrm>
+          <a:prstGeom prst="straightConnector1">
+            <a:avLst/>
+          </a:prstGeom>
+          <a:ln>
+            <a:solidFill>
+              <a:schemeClr val="accent1"/>
+            </a:solidFill>
+            <a:tailEnd type="triangle"/>
+          </a:ln>
+        </p:spPr>
+        <p:style>
+          <a:lnRef idx="1">
+            <a:schemeClr val="dk1"/>
+          </a:lnRef>
+          <a:fillRef idx="0">
+            <a:schemeClr val="dk1"/>
+          </a:fillRef>
+          <a:effectRef idx="0">
+            <a:schemeClr val="dk1"/>
+          </a:effectRef>
+          <a:fontRef idx="minor">
+            <a:schemeClr val="tx1"/>
+          </a:fontRef>
+        </p:style>
+      </p:cxnSp>
+      <p:sp>
+        <p:nvSpPr>
+          <p:cNvPr id="53" name="TextBox 52">
+            <a:extLst>
+              <a:ext uri="{FF2B5EF4-FFF2-40B4-BE49-F238E27FC236}">
+                <a16:creationId xmlns:a16="http://schemas.microsoft.com/office/drawing/2014/main" id="{FF8FBCC5-5CBE-43AC-874B-0472C3956A17}"/>
+              </a:ext>
+            </a:extLst>
+          </p:cNvPr>
+          <p:cNvSpPr txBox="1"/>
+          <p:nvPr/>
+        </p:nvSpPr>
+        <p:spPr>
+          <a:xfrm>
+            <a:off x="2619155" y="916576"/>
+            <a:ext cx="902811" cy="584775"/>
+          </a:xfrm>
+          <a:prstGeom prst="rect">
+            <a:avLst/>
+          </a:prstGeom>
+          <a:noFill/>
+        </p:spPr>
+        <p:txBody>
+          <a:bodyPr wrap="none" rtlCol="0">
+            <a:spAutoFit/>
+          </a:bodyPr>
+          <a:lstStyle/>
+          <a:p>
+            <a:r>
+              <a:rPr lang="en-US" sz="1600" dirty="0">
+                <a:solidFill>
+                  <a:schemeClr val="accent1"/>
+                </a:solidFill>
+                <a:latin typeface="Times New Roman" panose="02020603050405020304" pitchFamily="18" charset="0"/>
+                <a:cs typeface="Times New Roman" panose="02020603050405020304" pitchFamily="18" charset="0"/>
+              </a:rPr>
+              <a:t>Contact</a:t>
+            </a:r>
+          </a:p>
+          <a:p>
+            <a:r>
+              <a:rPr lang="en-US" sz="1600" dirty="0">
+                <a:solidFill>
+                  <a:schemeClr val="accent1"/>
+                </a:solidFill>
+                <a:latin typeface="Times New Roman" panose="02020603050405020304" pitchFamily="18" charset="0"/>
+                <a:cs typeface="Times New Roman" panose="02020603050405020304" pitchFamily="18" charset="0"/>
+              </a:rPr>
+              <a:t>Network</a:t>
+            </a:r>
+            <a:endParaRPr lang="en-IN" sz="1600" dirty="0">
+              <a:solidFill>
+                <a:schemeClr val="accent1"/>
+              </a:solidFill>
+              <a:latin typeface="Times New Roman" panose="02020603050405020304" pitchFamily="18" charset="0"/>
+              <a:cs typeface="Times New Roman" panose="02020603050405020304" pitchFamily="18" charset="0"/>
+            </a:endParaRPr>
+          </a:p>
+        </p:txBody>
+      </p:sp>
+      <p:cxnSp>
+        <p:nvCxnSpPr>
+          <p:cNvPr id="57" name="Straight Arrow Connector 56">
+            <a:extLst>
+              <a:ext uri="{FF2B5EF4-FFF2-40B4-BE49-F238E27FC236}">
+                <a16:creationId xmlns:a16="http://schemas.microsoft.com/office/drawing/2014/main" id="{DDE8AFC7-7615-4132-87AC-57BDE407254F}"/>
+              </a:ext>
+            </a:extLst>
+          </p:cNvPr>
+          <p:cNvCxnSpPr>
+            <a:cxnSpLocks/>
+          </p:cNvCxnSpPr>
+          <p:nvPr/>
+        </p:nvCxnSpPr>
+        <p:spPr>
+          <a:xfrm flipV="1">
+            <a:off x="5411100" y="965480"/>
+            <a:ext cx="0" cy="1077440"/>
+          </a:xfrm>
+          <a:prstGeom prst="straightConnector1">
+            <a:avLst/>
+          </a:prstGeom>
+          <a:ln>
+            <a:solidFill>
+              <a:schemeClr val="accent1"/>
+            </a:solidFill>
+            <a:tailEnd type="triangle"/>
+          </a:ln>
+        </p:spPr>
+        <p:style>
+          <a:lnRef idx="1">
+            <a:schemeClr val="dk1"/>
+          </a:lnRef>
+          <a:fillRef idx="0">
+            <a:schemeClr val="dk1"/>
+          </a:fillRef>
+          <a:effectRef idx="0">
+            <a:schemeClr val="dk1"/>
+          </a:effectRef>
+          <a:fontRef idx="minor">
+            <a:schemeClr val="tx1"/>
+          </a:fontRef>
+        </p:style>
+      </p:cxnSp>
+      <p:sp>
+        <p:nvSpPr>
+          <p:cNvPr id="64" name="TextBox 63">
+            <a:extLst>
+              <a:ext uri="{FF2B5EF4-FFF2-40B4-BE49-F238E27FC236}">
+                <a16:creationId xmlns:a16="http://schemas.microsoft.com/office/drawing/2014/main" id="{5F806E2E-520A-4352-B4B2-9A0D7B7FE094}"/>
+              </a:ext>
+            </a:extLst>
+          </p:cNvPr>
+          <p:cNvSpPr txBox="1"/>
+          <p:nvPr/>
+        </p:nvSpPr>
+        <p:spPr>
+          <a:xfrm>
+            <a:off x="4574327" y="924822"/>
+            <a:ext cx="902811" cy="584775"/>
+          </a:xfrm>
+          <a:prstGeom prst="rect">
+            <a:avLst/>
+          </a:prstGeom>
+          <a:noFill/>
+        </p:spPr>
+        <p:txBody>
+          <a:bodyPr wrap="none" rtlCol="0">
+            <a:spAutoFit/>
+          </a:bodyPr>
+          <a:lstStyle/>
+          <a:p>
+            <a:r>
+              <a:rPr lang="en-US" sz="1600" dirty="0">
+                <a:solidFill>
+                  <a:schemeClr val="accent1"/>
+                </a:solidFill>
+                <a:latin typeface="Times New Roman" panose="02020603050405020304" pitchFamily="18" charset="0"/>
+                <a:cs typeface="Times New Roman" panose="02020603050405020304" pitchFamily="18" charset="0"/>
+              </a:rPr>
+              <a:t>Contact</a:t>
+            </a:r>
+          </a:p>
+          <a:p>
+            <a:r>
+              <a:rPr lang="en-US" sz="1600" dirty="0">
+                <a:solidFill>
+                  <a:schemeClr val="accent1"/>
+                </a:solidFill>
+                <a:latin typeface="Times New Roman" panose="02020603050405020304" pitchFamily="18" charset="0"/>
+                <a:cs typeface="Times New Roman" panose="02020603050405020304" pitchFamily="18" charset="0"/>
+              </a:rPr>
+              <a:t>Network</a:t>
+            </a:r>
+            <a:endParaRPr lang="en-IN" sz="1600" dirty="0">
+              <a:solidFill>
+                <a:schemeClr val="accent1"/>
+              </a:solidFill>
+              <a:latin typeface="Times New Roman" panose="02020603050405020304" pitchFamily="18" charset="0"/>
+              <a:cs typeface="Times New Roman" panose="02020603050405020304" pitchFamily="18" charset="0"/>
+            </a:endParaRPr>
+          </a:p>
+        </p:txBody>
+      </p:sp>
+      <p:cxnSp>
+        <p:nvCxnSpPr>
+          <p:cNvPr id="65" name="Straight Arrow Connector 64">
+            <a:extLst>
+              <a:ext uri="{FF2B5EF4-FFF2-40B4-BE49-F238E27FC236}">
+                <a16:creationId xmlns:a16="http://schemas.microsoft.com/office/drawing/2014/main" id="{058ED843-23C6-4D5F-9637-188995D8CE52}"/>
+              </a:ext>
+            </a:extLst>
+          </p:cNvPr>
+          <p:cNvCxnSpPr>
+            <a:cxnSpLocks/>
+          </p:cNvCxnSpPr>
+          <p:nvPr/>
+        </p:nvCxnSpPr>
+        <p:spPr>
+          <a:xfrm flipV="1">
+            <a:off x="8341831" y="965480"/>
+            <a:ext cx="0" cy="1077440"/>
+          </a:xfrm>
+          <a:prstGeom prst="straightConnector1">
+            <a:avLst/>
+          </a:prstGeom>
+          <a:ln>
+            <a:solidFill>
+              <a:schemeClr val="accent1"/>
+            </a:solidFill>
+            <a:tailEnd type="triangle"/>
+          </a:ln>
+        </p:spPr>
+        <p:style>
+          <a:lnRef idx="1">
+            <a:schemeClr val="dk1"/>
+          </a:lnRef>
+          <a:fillRef idx="0">
+            <a:schemeClr val="dk1"/>
+          </a:fillRef>
+          <a:effectRef idx="0">
+            <a:schemeClr val="dk1"/>
+          </a:effectRef>
+          <a:fontRef idx="minor">
+            <a:schemeClr val="tx1"/>
+          </a:fontRef>
+        </p:style>
+      </p:cxnSp>
+      <p:sp>
+        <p:nvSpPr>
+          <p:cNvPr id="66" name="TextBox 65">
+            <a:extLst>
+              <a:ext uri="{FF2B5EF4-FFF2-40B4-BE49-F238E27FC236}">
+                <a16:creationId xmlns:a16="http://schemas.microsoft.com/office/drawing/2014/main" id="{A7C9B317-E0FA-46C4-9D59-F74BA31FB4B2}"/>
+              </a:ext>
+            </a:extLst>
+          </p:cNvPr>
+          <p:cNvSpPr txBox="1"/>
+          <p:nvPr/>
+        </p:nvSpPr>
+        <p:spPr>
+          <a:xfrm>
+            <a:off x="7505058" y="924822"/>
+            <a:ext cx="902811" cy="584775"/>
+          </a:xfrm>
+          <a:prstGeom prst="rect">
+            <a:avLst/>
+          </a:prstGeom>
+          <a:noFill/>
+        </p:spPr>
+        <p:txBody>
+          <a:bodyPr wrap="none" rtlCol="0">
+            <a:spAutoFit/>
+          </a:bodyPr>
+          <a:lstStyle/>
+          <a:p>
+            <a:r>
+              <a:rPr lang="en-US" sz="1600" dirty="0">
+                <a:solidFill>
+                  <a:schemeClr val="accent1"/>
+                </a:solidFill>
+                <a:latin typeface="Times New Roman" panose="02020603050405020304" pitchFamily="18" charset="0"/>
+                <a:cs typeface="Times New Roman" panose="02020603050405020304" pitchFamily="18" charset="0"/>
+              </a:rPr>
+              <a:t>Contact</a:t>
+            </a:r>
+          </a:p>
+          <a:p>
+            <a:r>
+              <a:rPr lang="en-US" sz="1600" dirty="0">
+                <a:solidFill>
+                  <a:schemeClr val="accent1"/>
+                </a:solidFill>
+                <a:latin typeface="Times New Roman" panose="02020603050405020304" pitchFamily="18" charset="0"/>
+                <a:cs typeface="Times New Roman" panose="02020603050405020304" pitchFamily="18" charset="0"/>
+              </a:rPr>
+              <a:t>Network</a:t>
+            </a:r>
+            <a:endParaRPr lang="en-IN" sz="1600" dirty="0">
+              <a:solidFill>
+                <a:schemeClr val="accent1"/>
+              </a:solidFill>
+              <a:latin typeface="Times New Roman" panose="02020603050405020304" pitchFamily="18" charset="0"/>
+              <a:cs typeface="Times New Roman" panose="02020603050405020304" pitchFamily="18" charset="0"/>
+            </a:endParaRPr>
+          </a:p>
+        </p:txBody>
+      </p:sp>
+      <p:cxnSp>
+        <p:nvCxnSpPr>
+          <p:cNvPr id="67" name="Straight Arrow Connector 66">
+            <a:extLst>
+              <a:ext uri="{FF2B5EF4-FFF2-40B4-BE49-F238E27FC236}">
+                <a16:creationId xmlns:a16="http://schemas.microsoft.com/office/drawing/2014/main" id="{5027FA16-0BCA-41D0-A069-78797B50FCFD}"/>
+              </a:ext>
+            </a:extLst>
+          </p:cNvPr>
+          <p:cNvCxnSpPr>
+            <a:cxnSpLocks/>
+          </p:cNvCxnSpPr>
+          <p:nvPr/>
+        </p:nvCxnSpPr>
+        <p:spPr>
+          <a:xfrm>
+            <a:off x="4619244" y="975142"/>
+            <a:ext cx="0" cy="1077439"/>
+          </a:xfrm>
+          <a:prstGeom prst="straightConnector1">
+            <a:avLst/>
+          </a:prstGeom>
+          <a:ln>
+            <a:solidFill>
+              <a:schemeClr val="accent6">
+                <a:lumMod val="75000"/>
+              </a:schemeClr>
+            </a:solidFill>
+            <a:tailEnd type="triangle"/>
+          </a:ln>
+        </p:spPr>
+        <p:style>
+          <a:lnRef idx="1">
+            <a:schemeClr val="dk1"/>
+          </a:lnRef>
+          <a:fillRef idx="0">
+            <a:schemeClr val="dk1"/>
+          </a:fillRef>
+          <a:effectRef idx="0">
+            <a:schemeClr val="dk1"/>
+          </a:effectRef>
+          <a:fontRef idx="minor">
+            <a:schemeClr val="tx1"/>
+          </a:fontRef>
+        </p:style>
+      </p:cxnSp>
+      <p:sp>
+        <p:nvSpPr>
+          <p:cNvPr id="68" name="TextBox 67">
+            <a:extLst>
+              <a:ext uri="{FF2B5EF4-FFF2-40B4-BE49-F238E27FC236}">
+                <a16:creationId xmlns:a16="http://schemas.microsoft.com/office/drawing/2014/main" id="{C72E8029-B38F-4E67-B971-BC794381D408}"/>
+              </a:ext>
+            </a:extLst>
+          </p:cNvPr>
+          <p:cNvSpPr txBox="1"/>
+          <p:nvPr/>
+        </p:nvSpPr>
+        <p:spPr>
+          <a:xfrm>
+            <a:off x="4593176" y="1695642"/>
+            <a:ext cx="731566" cy="338554"/>
+          </a:xfrm>
+          <a:prstGeom prst="rect">
+            <a:avLst/>
+          </a:prstGeom>
+          <a:noFill/>
+        </p:spPr>
+        <p:txBody>
+          <a:bodyPr wrap="square" rtlCol="0">
+            <a:spAutoFit/>
+          </a:bodyPr>
+          <a:lstStyle/>
+          <a:p>
+            <a:r>
+              <a:rPr lang="en-US" sz="1600" dirty="0">
+                <a:solidFill>
+                  <a:schemeClr val="accent6">
+                    <a:lumMod val="75000"/>
+                  </a:schemeClr>
+                </a:solidFill>
+                <a:latin typeface="Times New Roman" panose="02020603050405020304" pitchFamily="18" charset="0"/>
+                <a:cs typeface="Times New Roman" panose="02020603050405020304" pitchFamily="18" charset="0"/>
+              </a:rPr>
+              <a:t>Seeds</a:t>
+            </a:r>
+            <a:endParaRPr lang="en-IN" sz="1600" dirty="0">
+              <a:solidFill>
+                <a:schemeClr val="accent6">
+                  <a:lumMod val="75000"/>
+                </a:schemeClr>
+              </a:solidFill>
+              <a:latin typeface="Times New Roman" panose="02020603050405020304" pitchFamily="18" charset="0"/>
+              <a:cs typeface="Times New Roman" panose="02020603050405020304" pitchFamily="18" charset="0"/>
+            </a:endParaRPr>
+          </a:p>
+        </p:txBody>
+      </p:sp>
+      <p:cxnSp>
+        <p:nvCxnSpPr>
+          <p:cNvPr id="69" name="Straight Arrow Connector 68">
+            <a:extLst>
+              <a:ext uri="{FF2B5EF4-FFF2-40B4-BE49-F238E27FC236}">
+                <a16:creationId xmlns:a16="http://schemas.microsoft.com/office/drawing/2014/main" id="{B91BAFBC-4CB2-4E91-92FE-823B4B18888F}"/>
+              </a:ext>
+            </a:extLst>
+          </p:cNvPr>
+          <p:cNvCxnSpPr>
+            <a:cxnSpLocks/>
+          </p:cNvCxnSpPr>
+          <p:nvPr/>
+        </p:nvCxnSpPr>
+        <p:spPr>
+          <a:xfrm>
+            <a:off x="5593428" y="963679"/>
+            <a:ext cx="0" cy="1077439"/>
+          </a:xfrm>
+          <a:prstGeom prst="straightConnector1">
+            <a:avLst/>
+          </a:prstGeom>
+          <a:ln>
+            <a:solidFill>
+              <a:schemeClr val="accent6">
+                <a:lumMod val="75000"/>
+              </a:schemeClr>
+            </a:solidFill>
+            <a:tailEnd type="triangle"/>
+          </a:ln>
+        </p:spPr>
+        <p:style>
+          <a:lnRef idx="1">
+            <a:schemeClr val="dk1"/>
+          </a:lnRef>
+          <a:fillRef idx="0">
+            <a:schemeClr val="dk1"/>
+          </a:fillRef>
+          <a:effectRef idx="0">
+            <a:schemeClr val="dk1"/>
+          </a:effectRef>
+          <a:fontRef idx="minor">
+            <a:schemeClr val="tx1"/>
+          </a:fontRef>
+        </p:style>
+      </p:cxnSp>
+      <p:sp>
+        <p:nvSpPr>
+          <p:cNvPr id="70" name="TextBox 69">
+            <a:extLst>
+              <a:ext uri="{FF2B5EF4-FFF2-40B4-BE49-F238E27FC236}">
+                <a16:creationId xmlns:a16="http://schemas.microsoft.com/office/drawing/2014/main" id="{D2897957-50EC-403F-9CE7-D7EA52CB40AD}"/>
+              </a:ext>
+            </a:extLst>
+          </p:cNvPr>
+          <p:cNvSpPr txBox="1"/>
+          <p:nvPr/>
+        </p:nvSpPr>
+        <p:spPr>
+          <a:xfrm>
+            <a:off x="5567360" y="1684179"/>
+            <a:ext cx="731566" cy="338554"/>
+          </a:xfrm>
+          <a:prstGeom prst="rect">
+            <a:avLst/>
+          </a:prstGeom>
+          <a:noFill/>
+        </p:spPr>
+        <p:txBody>
+          <a:bodyPr wrap="square" rtlCol="0">
+            <a:spAutoFit/>
+          </a:bodyPr>
+          <a:lstStyle/>
+          <a:p>
+            <a:r>
+              <a:rPr lang="en-US" sz="1600" dirty="0">
+                <a:solidFill>
+                  <a:schemeClr val="accent6">
+                    <a:lumMod val="75000"/>
+                  </a:schemeClr>
+                </a:solidFill>
+                <a:latin typeface="Times New Roman" panose="02020603050405020304" pitchFamily="18" charset="0"/>
+                <a:cs typeface="Times New Roman" panose="02020603050405020304" pitchFamily="18" charset="0"/>
+              </a:rPr>
+              <a:t>Seeds</a:t>
+            </a:r>
+            <a:endParaRPr lang="en-IN" sz="1600" dirty="0">
+              <a:solidFill>
+                <a:schemeClr val="accent6">
+                  <a:lumMod val="75000"/>
+                </a:schemeClr>
+              </a:solidFill>
+              <a:latin typeface="Times New Roman" panose="02020603050405020304" pitchFamily="18" charset="0"/>
+              <a:cs typeface="Times New Roman" panose="02020603050405020304" pitchFamily="18" charset="0"/>
+            </a:endParaRPr>
+          </a:p>
+        </p:txBody>
+      </p:sp>
+      <p:cxnSp>
+        <p:nvCxnSpPr>
+          <p:cNvPr id="73" name="Straight Arrow Connector 72">
+            <a:extLst>
+              <a:ext uri="{FF2B5EF4-FFF2-40B4-BE49-F238E27FC236}">
+                <a16:creationId xmlns:a16="http://schemas.microsoft.com/office/drawing/2014/main" id="{DF0C4C3D-2FA6-4062-9A58-E55467FF0CA8}"/>
+              </a:ext>
+            </a:extLst>
+          </p:cNvPr>
+          <p:cNvCxnSpPr>
+            <a:cxnSpLocks/>
+          </p:cNvCxnSpPr>
+          <p:nvPr/>
+        </p:nvCxnSpPr>
+        <p:spPr>
+          <a:xfrm>
+            <a:off x="8530941" y="968026"/>
+            <a:ext cx="0" cy="1077439"/>
+          </a:xfrm>
+          <a:prstGeom prst="straightConnector1">
+            <a:avLst/>
+          </a:prstGeom>
+          <a:ln>
+            <a:solidFill>
+              <a:schemeClr val="accent6">
+                <a:lumMod val="75000"/>
+              </a:schemeClr>
+            </a:solidFill>
+            <a:tailEnd type="triangle"/>
+          </a:ln>
+        </p:spPr>
+        <p:style>
+          <a:lnRef idx="1">
+            <a:schemeClr val="dk1"/>
+          </a:lnRef>
+          <a:fillRef idx="0">
+            <a:schemeClr val="dk1"/>
+          </a:fillRef>
+          <a:effectRef idx="0">
+            <a:schemeClr val="dk1"/>
+          </a:effectRef>
+          <a:fontRef idx="minor">
+            <a:schemeClr val="tx1"/>
+          </a:fontRef>
+        </p:style>
+      </p:cxnSp>
+      <p:sp>
+        <p:nvSpPr>
+          <p:cNvPr id="84" name="TextBox 83">
+            <a:extLst>
+              <a:ext uri="{FF2B5EF4-FFF2-40B4-BE49-F238E27FC236}">
+                <a16:creationId xmlns:a16="http://schemas.microsoft.com/office/drawing/2014/main" id="{20892430-134A-40C3-992B-FF01BED3BAD7}"/>
+              </a:ext>
+            </a:extLst>
+          </p:cNvPr>
+          <p:cNvSpPr txBox="1"/>
+          <p:nvPr/>
+        </p:nvSpPr>
+        <p:spPr>
+          <a:xfrm>
+            <a:off x="8504873" y="1688526"/>
+            <a:ext cx="731566" cy="338554"/>
+          </a:xfrm>
+          <a:prstGeom prst="rect">
+            <a:avLst/>
+          </a:prstGeom>
+          <a:noFill/>
+        </p:spPr>
+        <p:txBody>
+          <a:bodyPr wrap="square" rtlCol="0">
+            <a:spAutoFit/>
+          </a:bodyPr>
+          <a:lstStyle/>
+          <a:p>
+            <a:r>
+              <a:rPr lang="en-US" sz="1600" dirty="0">
+                <a:solidFill>
+                  <a:schemeClr val="accent6">
+                    <a:lumMod val="75000"/>
+                  </a:schemeClr>
+                </a:solidFill>
+                <a:latin typeface="Times New Roman" panose="02020603050405020304" pitchFamily="18" charset="0"/>
+                <a:cs typeface="Times New Roman" panose="02020603050405020304" pitchFamily="18" charset="0"/>
+              </a:rPr>
+              <a:t>Seeds</a:t>
+            </a:r>
+            <a:endParaRPr lang="en-IN" sz="1600" dirty="0">
+              <a:solidFill>
+                <a:schemeClr val="accent6">
+                  <a:lumMod val="75000"/>
+                </a:schemeClr>
               </a:solidFill>
               <a:latin typeface="Times New Roman" panose="02020603050405020304" pitchFamily="18" charset="0"/>
               <a:cs typeface="Times New Roman" panose="02020603050405020304" pitchFamily="18" charset="0"/>

</xml_diff>